<commit_message>
Commit 4 - Extra Documentation
</commit_message>
<xml_diff>
--- a/Documentation/05 - Step-By-Step_Exception_Handling/Step-By-Step_Exception_Handling_pptx/Step-By-Step_Exception_Handling.pptx
+++ b/Documentation/05 - Step-By-Step_Exception_Handling/Step-By-Step_Exception_Handling_pptx/Step-By-Step_Exception_Handling.pptx
@@ -37,6 +37,7 @@
     <p:sldId id="299" r:id="rId31"/>
     <p:sldId id="300" r:id="rId32"/>
     <p:sldId id="301" r:id="rId33"/>
+    <p:sldId id="302" r:id="rId34"/>
   </p:sldIdLst>
   <p:sldSz cx="12192000" cy="6858000"/>
   <p:notesSz cx="6858000" cy="9144000"/>
@@ -292,7 +293,7 @@
           <a:p>
             <a:fld id="{00D3A82C-1579-474C-9620-BB4227A0D006}" type="datetimeFigureOut">
               <a:rPr lang="el-GR" smtClean="0"/>
-              <a:t>25/1/2023</a:t>
+              <a:t>26/1/2023</a:t>
             </a:fld>
             <a:endParaRPr lang="el-GR"/>
           </a:p>
@@ -492,7 +493,7 @@
           <a:p>
             <a:fld id="{00D3A82C-1579-474C-9620-BB4227A0D006}" type="datetimeFigureOut">
               <a:rPr lang="el-GR" smtClean="0"/>
-              <a:t>25/1/2023</a:t>
+              <a:t>26/1/2023</a:t>
             </a:fld>
             <a:endParaRPr lang="el-GR"/>
           </a:p>
@@ -702,7 +703,7 @@
           <a:p>
             <a:fld id="{00D3A82C-1579-474C-9620-BB4227A0D006}" type="datetimeFigureOut">
               <a:rPr lang="el-GR" smtClean="0"/>
-              <a:t>25/1/2023</a:t>
+              <a:t>26/1/2023</a:t>
             </a:fld>
             <a:endParaRPr lang="el-GR"/>
           </a:p>
@@ -902,7 +903,7 @@
           <a:p>
             <a:fld id="{00D3A82C-1579-474C-9620-BB4227A0D006}" type="datetimeFigureOut">
               <a:rPr lang="el-GR" smtClean="0"/>
-              <a:t>25/1/2023</a:t>
+              <a:t>26/1/2023</a:t>
             </a:fld>
             <a:endParaRPr lang="el-GR"/>
           </a:p>
@@ -1178,7 +1179,7 @@
           <a:p>
             <a:fld id="{00D3A82C-1579-474C-9620-BB4227A0D006}" type="datetimeFigureOut">
               <a:rPr lang="el-GR" smtClean="0"/>
-              <a:t>25/1/2023</a:t>
+              <a:t>26/1/2023</a:t>
             </a:fld>
             <a:endParaRPr lang="el-GR"/>
           </a:p>
@@ -1446,7 +1447,7 @@
           <a:p>
             <a:fld id="{00D3A82C-1579-474C-9620-BB4227A0D006}" type="datetimeFigureOut">
               <a:rPr lang="el-GR" smtClean="0"/>
-              <a:t>25/1/2023</a:t>
+              <a:t>26/1/2023</a:t>
             </a:fld>
             <a:endParaRPr lang="el-GR"/>
           </a:p>
@@ -1861,7 +1862,7 @@
           <a:p>
             <a:fld id="{00D3A82C-1579-474C-9620-BB4227A0D006}" type="datetimeFigureOut">
               <a:rPr lang="el-GR" smtClean="0"/>
-              <a:t>25/1/2023</a:t>
+              <a:t>26/1/2023</a:t>
             </a:fld>
             <a:endParaRPr lang="el-GR"/>
           </a:p>
@@ -2003,7 +2004,7 @@
           <a:p>
             <a:fld id="{00D3A82C-1579-474C-9620-BB4227A0D006}" type="datetimeFigureOut">
               <a:rPr lang="el-GR" smtClean="0"/>
-              <a:t>25/1/2023</a:t>
+              <a:t>26/1/2023</a:t>
             </a:fld>
             <a:endParaRPr lang="el-GR"/>
           </a:p>
@@ -2116,7 +2117,7 @@
           <a:p>
             <a:fld id="{00D3A82C-1579-474C-9620-BB4227A0D006}" type="datetimeFigureOut">
               <a:rPr lang="el-GR" smtClean="0"/>
-              <a:t>25/1/2023</a:t>
+              <a:t>26/1/2023</a:t>
             </a:fld>
             <a:endParaRPr lang="el-GR"/>
           </a:p>
@@ -2429,7 +2430,7 @@
           <a:p>
             <a:fld id="{00D3A82C-1579-474C-9620-BB4227A0D006}" type="datetimeFigureOut">
               <a:rPr lang="el-GR" smtClean="0"/>
-              <a:t>25/1/2023</a:t>
+              <a:t>26/1/2023</a:t>
             </a:fld>
             <a:endParaRPr lang="el-GR"/>
           </a:p>
@@ -2718,7 +2719,7 @@
           <a:p>
             <a:fld id="{00D3A82C-1579-474C-9620-BB4227A0D006}" type="datetimeFigureOut">
               <a:rPr lang="el-GR" smtClean="0"/>
-              <a:t>25/1/2023</a:t>
+              <a:t>26/1/2023</a:t>
             </a:fld>
             <a:endParaRPr lang="el-GR"/>
           </a:p>
@@ -2961,7 +2962,7 @@
           <a:p>
             <a:fld id="{00D3A82C-1579-474C-9620-BB4227A0D006}" type="datetimeFigureOut">
               <a:rPr lang="el-GR" smtClean="0"/>
-              <a:t>25/1/2023</a:t>
+              <a:t>26/1/2023</a:t>
             </a:fld>
             <a:endParaRPr lang="el-GR"/>
           </a:p>
@@ -5757,6 +5758,130 @@
 </p:sld>
 </file>
 
+<file path=ppt/slides/slide33.xml><?xml version="1.0" encoding="utf-8"?>
+<p:sld xmlns:a="http://schemas.openxmlformats.org/drawingml/2006/main" xmlns:r="http://schemas.openxmlformats.org/officeDocument/2006/relationships" xmlns:p="http://schemas.openxmlformats.org/presentationml/2006/main">
+  <p:cSld>
+    <p:spTree>
+      <p:nvGrpSpPr>
+        <p:cNvPr id="1" name=""/>
+        <p:cNvGrpSpPr/>
+        <p:nvPr/>
+      </p:nvGrpSpPr>
+      <p:grpSpPr>
+        <a:xfrm>
+          <a:off x="0" y="0"/>
+          <a:ext cx="0" cy="0"/>
+          <a:chOff x="0" y="0"/>
+          <a:chExt cx="0" cy="0"/>
+        </a:xfrm>
+      </p:grpSpPr>
+      <p:pic>
+        <p:nvPicPr>
+          <p:cNvPr id="4" name="Picture 3" descr="A screenshot of a computer&#10;&#10;Description automatically generated with medium confidence">
+            <a:extLst>
+              <a:ext uri="{FF2B5EF4-FFF2-40B4-BE49-F238E27FC236}">
+                <a16:creationId xmlns:a16="http://schemas.microsoft.com/office/drawing/2014/main" id="{71596712-1075-4E4C-B7D6-51607D0A5244}"/>
+              </a:ext>
+            </a:extLst>
+          </p:cNvPr>
+          <p:cNvPicPr>
+            <a:picLocks noChangeAspect="1"/>
+          </p:cNvPicPr>
+          <p:nvPr/>
+        </p:nvPicPr>
+        <p:blipFill>
+          <a:blip r:embed="rId2">
+            <a:extLst>
+              <a:ext uri="{28A0092B-C50C-407E-A947-70E740481C1C}">
+                <a14:useLocalDpi xmlns:a14="http://schemas.microsoft.com/office/drawing/2010/main" val="0"/>
+              </a:ext>
+            </a:extLst>
+          </a:blip>
+          <a:stretch>
+            <a:fillRect/>
+          </a:stretch>
+        </p:blipFill>
+        <p:spPr>
+          <a:xfrm>
+            <a:off x="0" y="180975"/>
+            <a:ext cx="12192000" cy="6496050"/>
+          </a:xfrm>
+          <a:prstGeom prst="rect">
+            <a:avLst/>
+          </a:prstGeom>
+        </p:spPr>
+      </p:pic>
+      <p:sp>
+        <p:nvSpPr>
+          <p:cNvPr id="10" name="Rectangle 9">
+            <a:extLst>
+              <a:ext uri="{FF2B5EF4-FFF2-40B4-BE49-F238E27FC236}">
+                <a16:creationId xmlns:a16="http://schemas.microsoft.com/office/drawing/2014/main" id="{8F16E70B-BBF4-408D-9595-A576085170AD}"/>
+              </a:ext>
+            </a:extLst>
+          </p:cNvPr>
+          <p:cNvSpPr/>
+          <p:nvPr/>
+        </p:nvSpPr>
+        <p:spPr>
+          <a:xfrm>
+            <a:off x="1972177" y="989815"/>
+            <a:ext cx="7416920" cy="820131"/>
+          </a:xfrm>
+          <a:prstGeom prst="rect">
+            <a:avLst/>
+          </a:prstGeom>
+          <a:solidFill>
+            <a:schemeClr val="accent1">
+              <a:alpha val="32000"/>
+            </a:schemeClr>
+          </a:solidFill>
+          <a:ln>
+            <a:solidFill>
+              <a:schemeClr val="accent1">
+                <a:shade val="50000"/>
+              </a:schemeClr>
+            </a:solidFill>
+          </a:ln>
+        </p:spPr>
+        <p:style>
+          <a:lnRef idx="2">
+            <a:schemeClr val="accent1">
+              <a:shade val="50000"/>
+            </a:schemeClr>
+          </a:lnRef>
+          <a:fillRef idx="1">
+            <a:schemeClr val="accent1"/>
+          </a:fillRef>
+          <a:effectRef idx="0">
+            <a:schemeClr val="accent1"/>
+          </a:effectRef>
+          <a:fontRef idx="minor">
+            <a:schemeClr val="lt1"/>
+          </a:fontRef>
+        </p:style>
+        <p:txBody>
+          <a:bodyPr rtlCol="0" anchor="ctr"/>
+          <a:lstStyle/>
+          <a:p>
+            <a:pPr algn="ctr"/>
+            <a:endParaRPr lang="el-GR"/>
+          </a:p>
+        </p:txBody>
+      </p:sp>
+    </p:spTree>
+    <p:extLst>
+      <p:ext uri="{BB962C8B-B14F-4D97-AF65-F5344CB8AC3E}">
+        <p14:creationId xmlns:p14="http://schemas.microsoft.com/office/powerpoint/2010/main" val="1083228147"/>
+      </p:ext>
+    </p:extLst>
+  </p:cSld>
+  <p:clrMapOvr>
+    <a:masterClrMapping/>
+  </p:clrMapOvr>
+</p:sld>
+</file>
+
 <file path=ppt/slides/slide4.xml><?xml version="1.0" encoding="utf-8"?>
 <p:sld xmlns:a="http://schemas.openxmlformats.org/drawingml/2006/main" xmlns:r="http://schemas.openxmlformats.org/officeDocument/2006/relationships" xmlns:p="http://schemas.openxmlformats.org/presentationml/2006/main">
   <p:cSld>

</xml_diff>